<commit_message>
update first day ppt and task1
</commit_message>
<xml_diff>
--- a/day-1/Using Kubernetes Day 1.pptx
+++ b/day-1/Using Kubernetes Day 1.pptx
@@ -284,7 +284,7 @@
           <a:p>
             <a:fld id="{4F1F2598-CD9E-4308-8C1F-F0CAB254D96E}" type="datetimeFigureOut">
               <a:rPr lang="en-US" smtClean="0"/>
-              <a:t>11/18/21</a:t>
+              <a:t>2/8/22</a:t>
             </a:fld>
             <a:endParaRPr lang="en-US"/>
           </a:p>
@@ -452,7 +452,7 @@
           <a:p>
             <a:fld id="{4F1F2598-CD9E-4308-8C1F-F0CAB254D96E}" type="datetimeFigureOut">
               <a:rPr lang="en-US" smtClean="0"/>
-              <a:t>11/18/21</a:t>
+              <a:t>2/8/22</a:t>
             </a:fld>
             <a:endParaRPr lang="en-US"/>
           </a:p>
@@ -630,7 +630,7 @@
           <a:p>
             <a:fld id="{4F1F2598-CD9E-4308-8C1F-F0CAB254D96E}" type="datetimeFigureOut">
               <a:rPr lang="en-US" smtClean="0"/>
-              <a:t>11/18/21</a:t>
+              <a:t>2/8/22</a:t>
             </a:fld>
             <a:endParaRPr lang="en-US"/>
           </a:p>
@@ -798,7 +798,7 @@
           <a:p>
             <a:fld id="{4F1F2598-CD9E-4308-8C1F-F0CAB254D96E}" type="datetimeFigureOut">
               <a:rPr lang="en-US" smtClean="0"/>
-              <a:t>11/18/21</a:t>
+              <a:t>2/8/22</a:t>
             </a:fld>
             <a:endParaRPr lang="en-US"/>
           </a:p>
@@ -1043,7 +1043,7 @@
           <a:p>
             <a:fld id="{4F1F2598-CD9E-4308-8C1F-F0CAB254D96E}" type="datetimeFigureOut">
               <a:rPr lang="en-US" smtClean="0"/>
-              <a:t>11/18/21</a:t>
+              <a:t>2/8/22</a:t>
             </a:fld>
             <a:endParaRPr lang="en-US"/>
           </a:p>
@@ -1272,7 +1272,7 @@
           <a:p>
             <a:fld id="{4F1F2598-CD9E-4308-8C1F-F0CAB254D96E}" type="datetimeFigureOut">
               <a:rPr lang="en-US" smtClean="0"/>
-              <a:t>11/18/21</a:t>
+              <a:t>2/8/22</a:t>
             </a:fld>
             <a:endParaRPr lang="en-US"/>
           </a:p>
@@ -1636,7 +1636,7 @@
           <a:p>
             <a:fld id="{4F1F2598-CD9E-4308-8C1F-F0CAB254D96E}" type="datetimeFigureOut">
               <a:rPr lang="en-US" smtClean="0"/>
-              <a:t>11/18/21</a:t>
+              <a:t>2/8/22</a:t>
             </a:fld>
             <a:endParaRPr lang="en-US"/>
           </a:p>
@@ -1753,7 +1753,7 @@
           <a:p>
             <a:fld id="{4F1F2598-CD9E-4308-8C1F-F0CAB254D96E}" type="datetimeFigureOut">
               <a:rPr lang="en-US" smtClean="0"/>
-              <a:t>11/18/21</a:t>
+              <a:t>2/8/22</a:t>
             </a:fld>
             <a:endParaRPr lang="en-US"/>
           </a:p>
@@ -1848,7 +1848,7 @@
           <a:p>
             <a:fld id="{4F1F2598-CD9E-4308-8C1F-F0CAB254D96E}" type="datetimeFigureOut">
               <a:rPr lang="en-US" smtClean="0"/>
-              <a:t>11/18/21</a:t>
+              <a:t>2/8/22</a:t>
             </a:fld>
             <a:endParaRPr lang="en-US"/>
           </a:p>
@@ -2123,7 +2123,7 @@
           <a:p>
             <a:fld id="{4F1F2598-CD9E-4308-8C1F-F0CAB254D96E}" type="datetimeFigureOut">
               <a:rPr lang="en-US" smtClean="0"/>
-              <a:t>11/18/21</a:t>
+              <a:t>2/8/22</a:t>
             </a:fld>
             <a:endParaRPr lang="en-US"/>
           </a:p>
@@ -2375,7 +2375,7 @@
           <a:p>
             <a:fld id="{4F1F2598-CD9E-4308-8C1F-F0CAB254D96E}" type="datetimeFigureOut">
               <a:rPr lang="en-US" smtClean="0"/>
-              <a:t>11/18/21</a:t>
+              <a:t>2/8/22</a:t>
             </a:fld>
             <a:endParaRPr lang="en-US"/>
           </a:p>
@@ -2586,7 +2586,7 @@
           <a:p>
             <a:fld id="{4F1F2598-CD9E-4308-8C1F-F0CAB254D96E}" type="datetimeFigureOut">
               <a:rPr lang="en-US" smtClean="0"/>
-              <a:t>11/18/21</a:t>
+              <a:t>2/8/22</a:t>
             </a:fld>
             <a:endParaRPr lang="en-US"/>
           </a:p>
@@ -10369,12 +10369,20 @@
           <a:p>
             <a:pPr algn="ctr"/>
             <a:r>
+              <a:rPr lang="en-US" dirty="0">
+                <a:solidFill>
+                  <a:schemeClr val="tx1"/>
+                </a:solidFill>
+              </a:rPr>
+              <a:t>                     Docker Engine   or  (</a:t>
+            </a:r>
+            <a:r>
               <a:rPr lang="en-US" dirty="0" err="1">
                 <a:solidFill>
                   <a:schemeClr val="tx1"/>
                 </a:solidFill>
               </a:rPr>
-              <a:t>Docker</a:t>
+              <a:t>podman</a:t>
             </a:r>
             <a:r>
               <a:rPr lang="en-US" dirty="0">
@@ -10382,7 +10390,7 @@
                   <a:schemeClr val="tx1"/>
                 </a:solidFill>
               </a:rPr>
-              <a:t> Engine   or  (</a:t>
+              <a:t>/</a:t>
             </a:r>
             <a:r>
               <a:rPr lang="en-US" dirty="0" err="1">
@@ -11199,8 +11207,8 @@
         </p:blipFill>
         <p:spPr>
           <a:xfrm>
-            <a:off x="2979609" y="4584363"/>
-            <a:ext cx="1752051" cy="517554"/>
+            <a:off x="1703111" y="4631474"/>
+            <a:ext cx="1554151" cy="459095"/>
           </a:xfrm>
           <a:prstGeom prst="rect">
             <a:avLst/>
@@ -11236,8 +11244,8 @@
         </p:blipFill>
         <p:spPr>
           <a:xfrm>
-            <a:off x="1103420" y="4639806"/>
-            <a:ext cx="1405454" cy="421636"/>
+            <a:off x="324877" y="4685964"/>
+            <a:ext cx="1194506" cy="358352"/>
           </a:xfrm>
           <a:prstGeom prst="rect">
             <a:avLst/>
@@ -11252,7 +11260,7 @@
         </p:nvCxnSpPr>
         <p:spPr>
           <a:xfrm flipH="1">
-            <a:off x="2660203" y="4639806"/>
+            <a:off x="1501528" y="4668934"/>
             <a:ext cx="282314" cy="421636"/>
           </a:xfrm>
           <a:prstGeom prst="line">
@@ -12342,6 +12350,86 @@
           </a:p>
         </p:txBody>
       </p:sp>
+      <p:pic>
+        <p:nvPicPr>
+          <p:cNvPr id="11" name="Graphic 10">
+            <a:extLst>
+              <a:ext uri="{FF2B5EF4-FFF2-40B4-BE49-F238E27FC236}">
+                <a16:creationId xmlns:a16="http://schemas.microsoft.com/office/drawing/2014/main" id="{B16C4C51-3630-394B-A652-5B555DE5C4F7}"/>
+              </a:ext>
+            </a:extLst>
+          </p:cNvPr>
+          <p:cNvPicPr>
+            <a:picLocks noChangeAspect="1"/>
+          </p:cNvPicPr>
+          <p:nvPr/>
+        </p:nvPicPr>
+        <p:blipFill>
+          <a:blip r:embed="rId4">
+            <a:extLst>
+              <a:ext uri="{28A0092B-C50C-407E-A947-70E740481C1C}">
+                <a14:useLocalDpi xmlns:a14="http://schemas.microsoft.com/office/drawing/2010/main" val="0"/>
+              </a:ext>
+              <a:ext uri="{96DAC541-7B7A-43D3-8B79-37D633B846F1}">
+                <asvg:svgBlip xmlns:asvg="http://schemas.microsoft.com/office/drawing/2016/SVG/main" r:embed="rId5"/>
+              </a:ext>
+            </a:extLst>
+          </a:blip>
+          <a:stretch>
+            <a:fillRect/>
+          </a:stretch>
+        </p:blipFill>
+        <p:spPr>
+          <a:xfrm>
+            <a:off x="3449042" y="4711131"/>
+            <a:ext cx="1357095" cy="362871"/>
+          </a:xfrm>
+          <a:prstGeom prst="rect">
+            <a:avLst/>
+          </a:prstGeom>
+        </p:spPr>
+      </p:pic>
+      <p:cxnSp>
+        <p:nvCxnSpPr>
+          <p:cNvPr id="55" name="Straight Connector 54">
+            <a:extLst>
+              <a:ext uri="{FF2B5EF4-FFF2-40B4-BE49-F238E27FC236}">
+                <a16:creationId xmlns:a16="http://schemas.microsoft.com/office/drawing/2014/main" id="{276411D5-18C3-FB40-B81C-5A526BDA4AF7}"/>
+              </a:ext>
+            </a:extLst>
+          </p:cNvPr>
+          <p:cNvCxnSpPr/>
+          <p:nvPr/>
+        </p:nvCxnSpPr>
+        <p:spPr>
+          <a:xfrm flipH="1">
+            <a:off x="3142465" y="4661075"/>
+            <a:ext cx="282314" cy="421636"/>
+          </a:xfrm>
+          <a:prstGeom prst="line">
+            <a:avLst/>
+          </a:prstGeom>
+          <a:ln w="25400">
+            <a:solidFill>
+              <a:schemeClr val="tx1"/>
+            </a:solidFill>
+          </a:ln>
+        </p:spPr>
+        <p:style>
+          <a:lnRef idx="1">
+            <a:schemeClr val="accent1"/>
+          </a:lnRef>
+          <a:fillRef idx="0">
+            <a:schemeClr val="accent1"/>
+          </a:fillRef>
+          <a:effectRef idx="0">
+            <a:schemeClr val="accent1"/>
+          </a:effectRef>
+          <a:fontRef idx="minor">
+            <a:schemeClr val="tx1"/>
+          </a:fontRef>
+        </p:style>
+      </p:cxnSp>
     </p:spTree>
     <p:extLst>
       <p:ext uri="{BB962C8B-B14F-4D97-AF65-F5344CB8AC3E}">
@@ -30963,13 +31051,23 @@
             </a:pPr>
             <a:r>
               <a:rPr lang="en-US" sz="3600" dirty="0"/>
-              <a:t>Community includes Google, Red Hat, and over 2000 authors. (Source: </a:t>
+              <a:t>Community includes Google, Red Hat, and over 3000 authors. (Source: </a:t>
             </a:r>
             <a:r>
               <a:rPr lang="en-US" sz="3600" dirty="0">
                 <a:hlinkClick r:id="rId3"/>
               </a:rPr>
-              <a:t>CNCF)</a:t>
+              <a:t>k8s </a:t>
+            </a:r>
+            <a:r>
+              <a:rPr lang="en-US" sz="3600">
+                <a:hlinkClick r:id="rId3"/>
+              </a:rPr>
+              <a:t>github</a:t>
+            </a:r>
+            <a:r>
+              <a:rPr lang="en-US" sz="3600"/>
+              <a:t> )</a:t>
             </a:r>
             <a:endParaRPr lang="en-US" sz="3600" dirty="0"/>
           </a:p>

</xml_diff>

<commit_message>
update task2 (and save ppt)
</commit_message>
<xml_diff>
--- a/day-1/Using Kubernetes Day 1.pptx
+++ b/day-1/Using Kubernetes Day 1.pptx
@@ -283,7 +283,7 @@
           <a:p>
             <a:fld id="{4F1F2598-CD9E-4308-8C1F-F0CAB254D96E}" type="datetimeFigureOut">
               <a:rPr lang="en-US" smtClean="0"/>
-              <a:t>2/8/22</a:t>
+              <a:t>2/22/22</a:t>
             </a:fld>
             <a:endParaRPr lang="en-US"/>
           </a:p>
@@ -451,7 +451,7 @@
           <a:p>
             <a:fld id="{4F1F2598-CD9E-4308-8C1F-F0CAB254D96E}" type="datetimeFigureOut">
               <a:rPr lang="en-US" smtClean="0"/>
-              <a:t>2/8/22</a:t>
+              <a:t>2/22/22</a:t>
             </a:fld>
             <a:endParaRPr lang="en-US"/>
           </a:p>
@@ -629,7 +629,7 @@
           <a:p>
             <a:fld id="{4F1F2598-CD9E-4308-8C1F-F0CAB254D96E}" type="datetimeFigureOut">
               <a:rPr lang="en-US" smtClean="0"/>
-              <a:t>2/8/22</a:t>
+              <a:t>2/22/22</a:t>
             </a:fld>
             <a:endParaRPr lang="en-US"/>
           </a:p>
@@ -797,7 +797,7 @@
           <a:p>
             <a:fld id="{4F1F2598-CD9E-4308-8C1F-F0CAB254D96E}" type="datetimeFigureOut">
               <a:rPr lang="en-US" smtClean="0"/>
-              <a:t>2/8/22</a:t>
+              <a:t>2/22/22</a:t>
             </a:fld>
             <a:endParaRPr lang="en-US"/>
           </a:p>
@@ -1042,7 +1042,7 @@
           <a:p>
             <a:fld id="{4F1F2598-CD9E-4308-8C1F-F0CAB254D96E}" type="datetimeFigureOut">
               <a:rPr lang="en-US" smtClean="0"/>
-              <a:t>2/8/22</a:t>
+              <a:t>2/22/22</a:t>
             </a:fld>
             <a:endParaRPr lang="en-US"/>
           </a:p>
@@ -1271,7 +1271,7 @@
           <a:p>
             <a:fld id="{4F1F2598-CD9E-4308-8C1F-F0CAB254D96E}" type="datetimeFigureOut">
               <a:rPr lang="en-US" smtClean="0"/>
-              <a:t>2/8/22</a:t>
+              <a:t>2/22/22</a:t>
             </a:fld>
             <a:endParaRPr lang="en-US"/>
           </a:p>
@@ -1635,7 +1635,7 @@
           <a:p>
             <a:fld id="{4F1F2598-CD9E-4308-8C1F-F0CAB254D96E}" type="datetimeFigureOut">
               <a:rPr lang="en-US" smtClean="0"/>
-              <a:t>2/8/22</a:t>
+              <a:t>2/22/22</a:t>
             </a:fld>
             <a:endParaRPr lang="en-US"/>
           </a:p>
@@ -1752,7 +1752,7 @@
           <a:p>
             <a:fld id="{4F1F2598-CD9E-4308-8C1F-F0CAB254D96E}" type="datetimeFigureOut">
               <a:rPr lang="en-US" smtClean="0"/>
-              <a:t>2/8/22</a:t>
+              <a:t>2/22/22</a:t>
             </a:fld>
             <a:endParaRPr lang="en-US"/>
           </a:p>
@@ -1847,7 +1847,7 @@
           <a:p>
             <a:fld id="{4F1F2598-CD9E-4308-8C1F-F0CAB254D96E}" type="datetimeFigureOut">
               <a:rPr lang="en-US" smtClean="0"/>
-              <a:t>2/8/22</a:t>
+              <a:t>2/22/22</a:t>
             </a:fld>
             <a:endParaRPr lang="en-US"/>
           </a:p>
@@ -2122,7 +2122,7 @@
           <a:p>
             <a:fld id="{4F1F2598-CD9E-4308-8C1F-F0CAB254D96E}" type="datetimeFigureOut">
               <a:rPr lang="en-US" smtClean="0"/>
-              <a:t>2/8/22</a:t>
+              <a:t>2/22/22</a:t>
             </a:fld>
             <a:endParaRPr lang="en-US"/>
           </a:p>
@@ -2374,7 +2374,7 @@
           <a:p>
             <a:fld id="{4F1F2598-CD9E-4308-8C1F-F0CAB254D96E}" type="datetimeFigureOut">
               <a:rPr lang="en-US" smtClean="0"/>
-              <a:t>2/8/22</a:t>
+              <a:t>2/22/22</a:t>
             </a:fld>
             <a:endParaRPr lang="en-US"/>
           </a:p>
@@ -2585,7 +2585,7 @@
           <a:p>
             <a:fld id="{4F1F2598-CD9E-4308-8C1F-F0CAB254D96E}" type="datetimeFigureOut">
               <a:rPr lang="en-US" smtClean="0"/>
-              <a:t>2/8/22</a:t>
+              <a:t>2/22/22</a:t>
             </a:fld>
             <a:endParaRPr lang="en-US"/>
           </a:p>
@@ -43530,7 +43530,7 @@
         </p:nvSpPr>
         <p:spPr>
           <a:xfrm>
-            <a:off x="6416772" y="3527110"/>
+            <a:off x="6383170" y="3509919"/>
             <a:ext cx="1611853" cy="276999"/>
           </a:xfrm>
           <a:prstGeom prst="rect">

</xml_diff>